<commit_message>
Editei o código e o pp
</commit_message>
<xml_diff>
--- a/Projeto 3 – Modelagem e simulação do mundo.pptx
+++ b/Projeto 3 – Modelagem e simulação do mundo.pptx
@@ -13,6 +13,7 @@
     <p:sldId id="261" r:id="rId7"/>
     <p:sldId id="262" r:id="rId8"/>
     <p:sldId id="263" r:id="rId9"/>
+    <p:sldId id="265" r:id="rId10"/>
   </p:sldIdLst>
   <p:sldSz cx="12192000" cy="6858000"/>
   <p:notesSz cx="6858000" cy="9144000"/>
@@ -320,7 +321,7 @@
           <a:p>
             <a:fld id="{4437695A-75CD-4F0E-AE51-B3FBB97CCA0D}" type="slidenum">
               <a:rPr lang="pt-BR" smtClean="0"/>
-              <a:t>‹#›</a:t>
+              <a:t>‹nº›</a:t>
             </a:fld>
             <a:endParaRPr lang="pt-BR"/>
           </a:p>
@@ -518,7 +519,7 @@
           <a:p>
             <a:fld id="{4437695A-75CD-4F0E-AE51-B3FBB97CCA0D}" type="slidenum">
               <a:rPr lang="pt-BR" smtClean="0"/>
-              <a:t>‹#›</a:t>
+              <a:t>‹nº›</a:t>
             </a:fld>
             <a:endParaRPr lang="pt-BR"/>
           </a:p>
@@ -726,7 +727,7 @@
           <a:p>
             <a:fld id="{4437695A-75CD-4F0E-AE51-B3FBB97CCA0D}" type="slidenum">
               <a:rPr lang="pt-BR" smtClean="0"/>
-              <a:t>‹#›</a:t>
+              <a:t>‹nº›</a:t>
             </a:fld>
             <a:endParaRPr lang="pt-BR"/>
           </a:p>
@@ -924,7 +925,7 @@
           <a:p>
             <a:fld id="{4437695A-75CD-4F0E-AE51-B3FBB97CCA0D}" type="slidenum">
               <a:rPr lang="pt-BR" smtClean="0"/>
-              <a:t>‹#›</a:t>
+              <a:t>‹nº›</a:t>
             </a:fld>
             <a:endParaRPr lang="pt-BR"/>
           </a:p>
@@ -1199,7 +1200,7 @@
           <a:p>
             <a:fld id="{4437695A-75CD-4F0E-AE51-B3FBB97CCA0D}" type="slidenum">
               <a:rPr lang="pt-BR" smtClean="0"/>
-              <a:t>‹#›</a:t>
+              <a:t>‹nº›</a:t>
             </a:fld>
             <a:endParaRPr lang="pt-BR"/>
           </a:p>
@@ -1464,7 +1465,7 @@
           <a:p>
             <a:fld id="{4437695A-75CD-4F0E-AE51-B3FBB97CCA0D}" type="slidenum">
               <a:rPr lang="pt-BR" smtClean="0"/>
-              <a:t>‹#›</a:t>
+              <a:t>‹nº›</a:t>
             </a:fld>
             <a:endParaRPr lang="pt-BR"/>
           </a:p>
@@ -1876,7 +1877,7 @@
           <a:p>
             <a:fld id="{4437695A-75CD-4F0E-AE51-B3FBB97CCA0D}" type="slidenum">
               <a:rPr lang="pt-BR" smtClean="0"/>
-              <a:t>‹#›</a:t>
+              <a:t>‹nº›</a:t>
             </a:fld>
             <a:endParaRPr lang="pt-BR"/>
           </a:p>
@@ -2017,7 +2018,7 @@
           <a:p>
             <a:fld id="{4437695A-75CD-4F0E-AE51-B3FBB97CCA0D}" type="slidenum">
               <a:rPr lang="pt-BR" smtClean="0"/>
-              <a:t>‹#›</a:t>
+              <a:t>‹nº›</a:t>
             </a:fld>
             <a:endParaRPr lang="pt-BR"/>
           </a:p>
@@ -2130,7 +2131,7 @@
           <a:p>
             <a:fld id="{4437695A-75CD-4F0E-AE51-B3FBB97CCA0D}" type="slidenum">
               <a:rPr lang="pt-BR" smtClean="0"/>
-              <a:t>‹#›</a:t>
+              <a:t>‹nº›</a:t>
             </a:fld>
             <a:endParaRPr lang="pt-BR"/>
           </a:p>
@@ -2441,7 +2442,7 @@
           <a:p>
             <a:fld id="{4437695A-75CD-4F0E-AE51-B3FBB97CCA0D}" type="slidenum">
               <a:rPr lang="pt-BR" smtClean="0"/>
-              <a:t>‹#›</a:t>
+              <a:t>‹nº›</a:t>
             </a:fld>
             <a:endParaRPr lang="pt-BR"/>
           </a:p>
@@ -2729,7 +2730,7 @@
           <a:p>
             <a:fld id="{4437695A-75CD-4F0E-AE51-B3FBB97CCA0D}" type="slidenum">
               <a:rPr lang="pt-BR" smtClean="0"/>
-              <a:t>‹#›</a:t>
+              <a:t>‹nº›</a:t>
             </a:fld>
             <a:endParaRPr lang="pt-BR"/>
           </a:p>
@@ -3006,7 +3007,7 @@
           <a:p>
             <a:fld id="{4437695A-75CD-4F0E-AE51-B3FBB97CCA0D}" type="slidenum">
               <a:rPr lang="pt-BR" smtClean="0"/>
-              <a:t>‹#›</a:t>
+              <a:t>‹nº›</a:t>
             </a:fld>
             <a:endParaRPr lang="pt-BR"/>
           </a:p>
@@ -3556,23 +3557,7 @@
                   <a:schemeClr val="accent1"/>
                 </a:solidFill>
               </a:rPr>
-              <a:t>Alunos: Enzo Neto, Felipe Junqueira, Fernando </a:t>
-            </a:r>
-            <a:r>
-              <a:rPr lang="pt-BR" dirty="0" err="1">
-                <a:solidFill>
-                  <a:schemeClr val="accent1"/>
-                </a:solidFill>
-              </a:rPr>
-              <a:t>Finccatti</a:t>
-            </a:r>
-            <a:r>
-              <a:rPr lang="pt-BR" dirty="0">
-                <a:solidFill>
-                  <a:schemeClr val="accent1"/>
-                </a:solidFill>
-              </a:rPr>
-              <a:t> e Pedro Célia</a:t>
+              <a:t>Alunos: Enzo Neto, Felipe Junqueira, Fernando Fincatti e Pedro Célia</a:t>
             </a:r>
           </a:p>
           <a:p>
@@ -3946,7 +3931,7 @@
                 <a:ea typeface="+mn-ea"/>
                 <a:cs typeface="+mn-cs"/>
               </a:rPr>
-              <a:t> no final da Rampa? E do Looping?</a:t>
+              <a:t> no final da rampa? E do looping?</a:t>
             </a:r>
           </a:p>
           <a:p>
@@ -6376,8 +6361,8 @@
         </p:blipFill>
         <p:spPr>
           <a:xfrm>
-            <a:off x="5533494" y="551495"/>
-            <a:ext cx="6015038" cy="2795607"/>
+            <a:off x="5297763" y="229073"/>
+            <a:ext cx="6450006" cy="2997767"/>
           </a:xfrm>
           <a:prstGeom prst="rect">
             <a:avLst/>
@@ -6406,8 +6391,8 @@
         </p:blipFill>
         <p:spPr>
           <a:xfrm>
-            <a:off x="5533494" y="3631160"/>
-            <a:ext cx="6015038" cy="2828209"/>
+            <a:off x="5456668" y="3631160"/>
+            <a:ext cx="6291101" cy="2958011"/>
           </a:xfrm>
           <a:prstGeom prst="rect">
             <a:avLst/>
@@ -6576,7 +6561,7 @@
           <a:p>
             <a:pPr algn="ctr"/>
             <a:r>
-              <a:rPr lang="en-US" sz="5400" kern="1200">
+              <a:rPr lang="en-US" sz="5400" kern="1200" dirty="0" err="1">
                 <a:solidFill>
                   <a:srgbClr val="FFFFFF"/>
                 </a:solidFill>
@@ -6585,6 +6570,17 @@
                 <a:cs typeface="+mj-cs"/>
               </a:rPr>
               <a:t>Conclusão</a:t>
+            </a:r>
+            <a:r>
+              <a:rPr lang="en-US" sz="5400" kern="1200" dirty="0">
+                <a:solidFill>
+                  <a:srgbClr val="FFFFFF"/>
+                </a:solidFill>
+                <a:latin typeface="+mj-lt"/>
+                <a:ea typeface="+mj-ea"/>
+                <a:cs typeface="+mj-cs"/>
+              </a:rPr>
+              <a:t> - rampa</a:t>
             </a:r>
           </a:p>
         </p:txBody>
@@ -6641,35 +6637,6 @@
           </a:fontRef>
         </p:style>
       </p:cxnSp>
-      <p:pic>
-        <p:nvPicPr>
-          <p:cNvPr id="6" name="Imagem 5">
-            <a:extLst>
-              <a:ext uri="{FF2B5EF4-FFF2-40B4-BE49-F238E27FC236}">
-                <a16:creationId xmlns:a16="http://schemas.microsoft.com/office/drawing/2014/main" id="{8AFF55F5-D931-4722-A3D3-3FCAC0C8D85F}"/>
-              </a:ext>
-            </a:extLst>
-          </p:cNvPr>
-          <p:cNvPicPr>
-            <a:picLocks noChangeAspect="1"/>
-          </p:cNvPicPr>
-          <p:nvPr/>
-        </p:nvPicPr>
-        <p:blipFill rotWithShape="1">
-          <a:blip r:embed="rId2"/>
-          <a:srcRect l="14130" t="26040" r="54654" b="33518"/>
-          <a:stretch/>
-        </p:blipFill>
-        <p:spPr>
-          <a:xfrm>
-            <a:off x="6817820" y="2718453"/>
-            <a:ext cx="5251090" cy="3824851"/>
-          </a:xfrm>
-          <a:prstGeom prst="rect">
-            <a:avLst/>
-          </a:prstGeom>
-        </p:spPr>
-      </p:pic>
       <p:sp>
         <p:nvSpPr>
           <p:cNvPr id="8" name="Seta: para a Direita 7">
@@ -6724,10 +6691,39 @@
       </p:sp>
       <p:pic>
         <p:nvPicPr>
-          <p:cNvPr id="10" name="Imagem 9">
-            <a:extLst>
-              <a:ext uri="{FF2B5EF4-FFF2-40B4-BE49-F238E27FC236}">
-                <a16:creationId xmlns:a16="http://schemas.microsoft.com/office/drawing/2014/main" id="{2BF17B63-9EBC-4CE3-A8EF-064ECE9763A2}"/>
+          <p:cNvPr id="3" name="Imagem 2">
+            <a:extLst>
+              <a:ext uri="{FF2B5EF4-FFF2-40B4-BE49-F238E27FC236}">
+                <a16:creationId xmlns:a16="http://schemas.microsoft.com/office/drawing/2014/main" id="{AD5D7847-0C63-4BF1-9E09-6A8C7BE49480}"/>
+              </a:ext>
+            </a:extLst>
+          </p:cNvPr>
+          <p:cNvPicPr>
+            <a:picLocks noChangeAspect="1"/>
+          </p:cNvPicPr>
+          <p:nvPr/>
+        </p:nvPicPr>
+        <p:blipFill rotWithShape="1">
+          <a:blip r:embed="rId2"/>
+          <a:srcRect l="14130" t="43010" r="55000" b="17665"/>
+          <a:stretch/>
+        </p:blipFill>
+        <p:spPr>
+          <a:xfrm>
+            <a:off x="6944139" y="2886578"/>
+            <a:ext cx="4782496" cy="3425363"/>
+          </a:xfrm>
+          <a:prstGeom prst="rect">
+            <a:avLst/>
+          </a:prstGeom>
+        </p:spPr>
+      </p:pic>
+      <p:pic>
+        <p:nvPicPr>
+          <p:cNvPr id="4" name="Imagem 3">
+            <a:extLst>
+              <a:ext uri="{FF2B5EF4-FFF2-40B4-BE49-F238E27FC236}">
+                <a16:creationId xmlns:a16="http://schemas.microsoft.com/office/drawing/2014/main" id="{1DE60845-5F6A-44A0-9756-A00872965FB9}"/>
               </a:ext>
             </a:extLst>
           </p:cNvPr>
@@ -6738,6 +6734,325 @@
         </p:nvPicPr>
         <p:blipFill rotWithShape="1">
           <a:blip r:embed="rId3"/>
+          <a:srcRect l="14239" t="42086" r="55109" b="18633"/>
+          <a:stretch/>
+        </p:blipFill>
+        <p:spPr>
+          <a:xfrm>
+            <a:off x="189403" y="2755003"/>
+            <a:ext cx="4754152" cy="3425363"/>
+          </a:xfrm>
+          <a:prstGeom prst="rect">
+            <a:avLst/>
+          </a:prstGeom>
+        </p:spPr>
+      </p:pic>
+    </p:spTree>
+    <p:extLst>
+      <p:ext uri="{BB962C8B-B14F-4D97-AF65-F5344CB8AC3E}">
+        <p14:creationId xmlns:p14="http://schemas.microsoft.com/office/powerpoint/2010/main" val="1179950777"/>
+      </p:ext>
+    </p:extLst>
+  </p:cSld>
+  <p:clrMapOvr>
+    <a:masterClrMapping/>
+  </p:clrMapOvr>
+</p:sld>
+</file>
+
+<file path=ppt/slides/slide9.xml><?xml version="1.0" encoding="utf-8"?>
+<p:sld xmlns:a="http://schemas.openxmlformats.org/drawingml/2006/main" xmlns:r="http://schemas.openxmlformats.org/officeDocument/2006/relationships" xmlns:p="http://schemas.openxmlformats.org/presentationml/2006/main">
+  <p:cSld>
+    <p:bg>
+      <p:bgPr>
+        <a:solidFill>
+          <a:schemeClr val="bg1"/>
+        </a:solidFill>
+        <a:effectLst/>
+      </p:bgPr>
+    </p:bg>
+    <p:spTree>
+      <p:nvGrpSpPr>
+        <p:cNvPr id="1" name=""/>
+        <p:cNvGrpSpPr/>
+        <p:nvPr/>
+      </p:nvGrpSpPr>
+      <p:grpSpPr>
+        <a:xfrm>
+          <a:off x="0" y="0"/>
+          <a:ext cx="0" cy="0"/>
+          <a:chOff x="0" y="0"/>
+          <a:chExt cx="0" cy="0"/>
+        </a:xfrm>
+      </p:grpSpPr>
+      <p:sp>
+        <p:nvSpPr>
+          <p:cNvPr id="9" name="Rectangle 8">
+            <a:extLst>
+              <a:ext uri="{FF2B5EF4-FFF2-40B4-BE49-F238E27FC236}">
+                <a16:creationId xmlns:a16="http://schemas.microsoft.com/office/drawing/2014/main" id="{823AC064-BC96-4F32-8AE1-B2FD38754823}"/>
+              </a:ext>
+              <a:ext uri="{C183D7F6-B498-43B3-948B-1728B52AA6E4}">
+                <adec:decorative xmlns:adec="http://schemas.microsoft.com/office/drawing/2017/decorative" val="1"/>
+              </a:ext>
+            </a:extLst>
+          </p:cNvPr>
+          <p:cNvSpPr>
+            <a:spLocks noGrp="1" noRot="1" noChangeAspect="1" noMove="1" noResize="1" noEditPoints="1" noAdjustHandles="1" noChangeArrowheads="1" noChangeShapeType="1" noTextEdit="1"/>
+          </p:cNvSpPr>
+          <p:nvPr>
+            <p:extLst>
+              <p:ext uri="{386F3935-93C4-4BCD-93E2-E3B085C9AB24}">
+                <p16:designElem xmlns:p16="http://schemas.microsoft.com/office/powerpoint/2015/main" val="1"/>
+              </p:ext>
+            </p:extLst>
+          </p:nvPr>
+        </p:nvSpPr>
+        <p:spPr bwMode="ltGray">
+          <a:xfrm>
+            <a:off x="378068" y="343486"/>
+            <a:ext cx="11438793" cy="1844256"/>
+          </a:xfrm>
+          <a:prstGeom prst="rect">
+            <a:avLst/>
+          </a:prstGeom>
+          <a:solidFill>
+            <a:srgbClr val="404040"/>
+          </a:solidFill>
+          <a:ln w="127000" cap="sq" cmpd="thinThick">
+            <a:solidFill>
+              <a:srgbClr val="404040"/>
+            </a:solidFill>
+          </a:ln>
+        </p:spPr>
+        <p:style>
+          <a:lnRef idx="2">
+            <a:schemeClr val="accent1">
+              <a:shade val="50000"/>
+            </a:schemeClr>
+          </a:lnRef>
+          <a:fillRef idx="1">
+            <a:schemeClr val="accent1"/>
+          </a:fillRef>
+          <a:effectRef idx="0">
+            <a:schemeClr val="accent1"/>
+          </a:effectRef>
+          <a:fontRef idx="minor">
+            <a:schemeClr val="lt1"/>
+          </a:fontRef>
+        </p:style>
+        <p:txBody>
+          <a:bodyPr rtlCol="0" anchor="ctr"/>
+          <a:lstStyle/>
+          <a:p>
+            <a:pPr marL="0" marR="0" lvl="0" indent="0" algn="ctr" defTabSz="914400" rtl="0" eaLnBrk="1" fontAlgn="auto" latinLnBrk="0" hangingPunct="1">
+              <a:lnSpc>
+                <a:spcPct val="100000"/>
+              </a:lnSpc>
+              <a:spcBef>
+                <a:spcPts val="0"/>
+              </a:spcBef>
+              <a:spcAft>
+                <a:spcPts val="0"/>
+              </a:spcAft>
+              <a:buClrTx/>
+              <a:buSzTx/>
+              <a:buFontTx/>
+              <a:buNone/>
+              <a:tabLst/>
+              <a:defRPr/>
+            </a:pPr>
+            <a:endParaRPr kumimoji="0" lang="en-US" sz="1800" b="0" i="0" u="none" strike="noStrike" kern="1200" cap="none" spc="0" normalizeH="0" baseline="0" noProof="0">
+              <a:ln>
+                <a:noFill/>
+              </a:ln>
+              <a:solidFill>
+                <a:prstClr val="white"/>
+              </a:solidFill>
+              <a:effectLst/>
+              <a:uLnTx/>
+              <a:uFillTx/>
+              <a:latin typeface="Calibri" panose="020F0502020204030204"/>
+              <a:ea typeface="+mn-ea"/>
+              <a:cs typeface="+mn-cs"/>
+            </a:endParaRPr>
+          </a:p>
+        </p:txBody>
+      </p:sp>
+      <p:sp>
+        <p:nvSpPr>
+          <p:cNvPr id="2" name="Título 1">
+            <a:extLst>
+              <a:ext uri="{FF2B5EF4-FFF2-40B4-BE49-F238E27FC236}">
+                <a16:creationId xmlns:a16="http://schemas.microsoft.com/office/drawing/2014/main" id="{71128E90-13E9-4540-B197-4B773034E2AD}"/>
+              </a:ext>
+            </a:extLst>
+          </p:cNvPr>
+          <p:cNvSpPr>
+            <a:spLocks noGrp="1"/>
+          </p:cNvSpPr>
+          <p:nvPr>
+            <p:ph type="title"/>
+          </p:nvPr>
+        </p:nvSpPr>
+        <p:spPr>
+          <a:xfrm>
+            <a:off x="526073" y="466578"/>
+            <a:ext cx="11139854" cy="930447"/>
+          </a:xfrm>
+        </p:spPr>
+        <p:txBody>
+          <a:bodyPr vert="horz" lIns="91440" tIns="45720" rIns="91440" bIns="45720" rtlCol="0" anchor="b">
+            <a:normAutofit/>
+          </a:bodyPr>
+          <a:lstStyle/>
+          <a:p>
+            <a:pPr algn="ctr"/>
+            <a:r>
+              <a:rPr lang="en-US" sz="5400" kern="1200" dirty="0" err="1">
+                <a:solidFill>
+                  <a:srgbClr val="FFFFFF"/>
+                </a:solidFill>
+                <a:latin typeface="+mj-lt"/>
+                <a:ea typeface="+mj-ea"/>
+                <a:cs typeface="+mj-cs"/>
+              </a:rPr>
+              <a:t>Conclusão</a:t>
+            </a:r>
+            <a:r>
+              <a:rPr lang="en-US" sz="5400" kern="1200" dirty="0">
+                <a:solidFill>
+                  <a:srgbClr val="FFFFFF"/>
+                </a:solidFill>
+                <a:latin typeface="+mj-lt"/>
+                <a:ea typeface="+mj-ea"/>
+                <a:cs typeface="+mj-cs"/>
+              </a:rPr>
+              <a:t> - looping</a:t>
+            </a:r>
+          </a:p>
+        </p:txBody>
+      </p:sp>
+      <p:cxnSp>
+        <p:nvCxnSpPr>
+          <p:cNvPr id="11" name="Straight Connector 10">
+            <a:extLst>
+              <a:ext uri="{FF2B5EF4-FFF2-40B4-BE49-F238E27FC236}">
+                <a16:creationId xmlns:a16="http://schemas.microsoft.com/office/drawing/2014/main" id="{7E7C77BC-7138-40B1-A15B-20F57A494629}"/>
+              </a:ext>
+              <a:ext uri="{C183D7F6-B498-43B3-948B-1728B52AA6E4}">
+                <adec:decorative xmlns:adec="http://schemas.microsoft.com/office/drawing/2017/decorative" val="1"/>
+              </a:ext>
+            </a:extLst>
+          </p:cNvPr>
+          <p:cNvCxnSpPr>
+            <a:cxnSpLocks noGrp="1" noRot="1" noChangeAspect="1" noMove="1" noResize="1" noEditPoints="1" noAdjustHandles="1" noChangeArrowheads="1" noChangeShapeType="1"/>
+          </p:cNvCxnSpPr>
+          <p:nvPr>
+            <p:extLst>
+              <p:ext uri="{386F3935-93C4-4BCD-93E2-E3B085C9AB24}">
+                <p16:designElem xmlns:p16="http://schemas.microsoft.com/office/powerpoint/2015/main" val="1"/>
+              </p:ext>
+            </p:extLst>
+          </p:nvPr>
+        </p:nvCxnSpPr>
+        <p:spPr>
+          <a:xfrm>
+            <a:off x="2209800" y="1448631"/>
+            <a:ext cx="7772400" cy="0"/>
+          </a:xfrm>
+          <a:prstGeom prst="line">
+            <a:avLst/>
+          </a:prstGeom>
+          <a:ln w="22225">
+            <a:solidFill>
+              <a:srgbClr val="D9D9D9"/>
+            </a:solidFill>
+          </a:ln>
+        </p:spPr>
+        <p:style>
+          <a:lnRef idx="1">
+            <a:schemeClr val="accent1"/>
+          </a:lnRef>
+          <a:fillRef idx="0">
+            <a:schemeClr val="accent1"/>
+          </a:fillRef>
+          <a:effectRef idx="0">
+            <a:schemeClr val="accent1"/>
+          </a:effectRef>
+          <a:fontRef idx="minor">
+            <a:schemeClr val="tx1"/>
+          </a:fontRef>
+        </p:style>
+      </p:cxnSp>
+      <p:sp>
+        <p:nvSpPr>
+          <p:cNvPr id="8" name="Seta: para a Direita 7">
+            <a:extLst>
+              <a:ext uri="{FF2B5EF4-FFF2-40B4-BE49-F238E27FC236}">
+                <a16:creationId xmlns:a16="http://schemas.microsoft.com/office/drawing/2014/main" id="{F861B9BC-5543-40CF-89B8-5767C3DBC40F}"/>
+              </a:ext>
+            </a:extLst>
+          </p:cNvPr>
+          <p:cNvSpPr/>
+          <p:nvPr/>
+        </p:nvSpPr>
+        <p:spPr>
+          <a:xfrm>
+            <a:off x="5353004" y="4293468"/>
+            <a:ext cx="1181686" cy="337410"/>
+          </a:xfrm>
+          <a:prstGeom prst="rightArrow">
+            <a:avLst/>
+          </a:prstGeom>
+          <a:solidFill>
+            <a:schemeClr val="tx1"/>
+          </a:solidFill>
+          <a:ln>
+            <a:noFill/>
+          </a:ln>
+        </p:spPr>
+        <p:style>
+          <a:lnRef idx="2">
+            <a:schemeClr val="accent1">
+              <a:shade val="50000"/>
+            </a:schemeClr>
+          </a:lnRef>
+          <a:fillRef idx="1">
+            <a:schemeClr val="accent1"/>
+          </a:fillRef>
+          <a:effectRef idx="0">
+            <a:schemeClr val="accent1"/>
+          </a:effectRef>
+          <a:fontRef idx="minor">
+            <a:schemeClr val="lt1"/>
+          </a:fontRef>
+        </p:style>
+        <p:txBody>
+          <a:bodyPr rtlCol="0" anchor="ctr"/>
+          <a:lstStyle/>
+          <a:p>
+            <a:pPr algn="ctr"/>
+            <a:endParaRPr lang="pt-BR"/>
+          </a:p>
+        </p:txBody>
+      </p:sp>
+      <p:pic>
+        <p:nvPicPr>
+          <p:cNvPr id="10" name="Imagem 9">
+            <a:extLst>
+              <a:ext uri="{FF2B5EF4-FFF2-40B4-BE49-F238E27FC236}">
+                <a16:creationId xmlns:a16="http://schemas.microsoft.com/office/drawing/2014/main" id="{2BF17B63-9EBC-4CE3-A8EF-064ECE9763A2}"/>
+              </a:ext>
+            </a:extLst>
+          </p:cNvPr>
+          <p:cNvPicPr>
+            <a:picLocks noChangeAspect="1"/>
+          </p:cNvPicPr>
+          <p:nvPr/>
+        </p:nvPicPr>
+        <p:blipFill rotWithShape="1">
+          <a:blip r:embed="rId2"/>
           <a:srcRect l="14348" t="41543" r="55109" b="19598"/>
           <a:stretch/>
         </p:blipFill>
@@ -6751,10 +7066,39 @@
           </a:prstGeom>
         </p:spPr>
       </p:pic>
+      <p:pic>
+        <p:nvPicPr>
+          <p:cNvPr id="3" name="Imagem 2">
+            <a:extLst>
+              <a:ext uri="{FF2B5EF4-FFF2-40B4-BE49-F238E27FC236}">
+                <a16:creationId xmlns:a16="http://schemas.microsoft.com/office/drawing/2014/main" id="{177185FB-D55F-43C2-AC47-C32077BA56EF}"/>
+              </a:ext>
+            </a:extLst>
+          </p:cNvPr>
+          <p:cNvPicPr>
+            <a:picLocks noChangeAspect="1"/>
+          </p:cNvPicPr>
+          <p:nvPr/>
+        </p:nvPicPr>
+        <p:blipFill rotWithShape="1">
+          <a:blip r:embed="rId3"/>
+          <a:srcRect l="14348" t="41724" r="55109" b="18631"/>
+          <a:stretch/>
+        </p:blipFill>
+        <p:spPr>
+          <a:xfrm>
+            <a:off x="6817820" y="2781478"/>
+            <a:ext cx="4946784" cy="3609944"/>
+          </a:xfrm>
+          <a:prstGeom prst="rect">
+            <a:avLst/>
+          </a:prstGeom>
+        </p:spPr>
+      </p:pic>
     </p:spTree>
     <p:extLst>
       <p:ext uri="{BB962C8B-B14F-4D97-AF65-F5344CB8AC3E}">
-        <p14:creationId xmlns:p14="http://schemas.microsoft.com/office/powerpoint/2010/main" val="1179950777"/>
+        <p14:creationId xmlns:p14="http://schemas.microsoft.com/office/powerpoint/2010/main" val="2882317598"/>
       </p:ext>
     </p:extLst>
   </p:cSld>

</xml_diff>